<commit_message>
Entrega final grupo 2
</commit_message>
<xml_diff>
--- a/HandsOn/Group02/presentation/Group02_SafeCycling.pptx
+++ b/HandsOn/Group02/presentation/Group02_SafeCycling.pptx
@@ -7014,7 +7014,23 @@
                   <a:srgbClr val="595959"/>
                 </a:solidFill>
               </a:rPr>
-              <a:t> y la </a:t>
+              <a:t>(license CC BY-NC-SA 4.0 </a:t>
+            </a:r>
+            <a:r>
+              <a:rPr lang="en-US" sz="2500" dirty="0" err="1">
+                <a:solidFill>
+                  <a:srgbClr val="595959"/>
+                </a:solidFill>
+              </a:rPr>
+              <a:t>Internacional</a:t>
+            </a:r>
+            <a:r>
+              <a:rPr lang="en-US" sz="2500" dirty="0">
+                <a:solidFill>
+                  <a:srgbClr val="595959"/>
+                </a:solidFill>
+              </a:rPr>
+              <a:t>) y la </a:t>
             </a:r>
             <a:r>
               <a:rPr lang="en-US" sz="2500" dirty="0" err="1">
@@ -7299,7 +7315,7 @@
         </p:blipFill>
         <p:spPr>
           <a:xfrm>
-            <a:off x="7082964" y="233249"/>
+            <a:off x="6816626" y="233249"/>
             <a:ext cx="1381125" cy="2276475"/>
           </a:xfrm>
           <a:prstGeom prst="rect">
@@ -7335,7 +7351,7 @@
         </p:blipFill>
         <p:spPr>
           <a:xfrm>
-            <a:off x="8438150" y="233249"/>
+            <a:off x="8171812" y="233249"/>
             <a:ext cx="1781175" cy="1781175"/>
           </a:xfrm>
           <a:prstGeom prst="rect">
@@ -7371,7 +7387,7 @@
         </p:blipFill>
         <p:spPr>
           <a:xfrm>
-            <a:off x="10219325" y="226471"/>
+            <a:off x="9952987" y="226471"/>
             <a:ext cx="1857375" cy="4019550"/>
           </a:xfrm>
           <a:prstGeom prst="rect">

</xml_diff>